<commit_message>
final Without Pruning part
</commit_message>
<xml_diff>
--- a/Assignment1/Assignment.pptx
+++ b/Assignment1/Assignment.pptx
@@ -8,6 +8,9 @@
     <p:sldId id="256" r:id="rId2"/>
     <p:sldId id="259" r:id="rId3"/>
     <p:sldId id="257" r:id="rId4"/>
+    <p:sldId id="260" r:id="rId5"/>
+    <p:sldId id="261" r:id="rId6"/>
+    <p:sldId id="262" r:id="rId7"/>
   </p:sldIdLst>
   <p:sldSz cx="9144000" cy="6858000" type="screen4x3"/>
   <p:notesSz cx="6858000" cy="9144000"/>
@@ -3571,15 +3574,7 @@
             </a:r>
             <a:r>
               <a:rPr lang="en-US" sz="3200" dirty="0" smtClean="0"/>
-              <a:t>(N</a:t>
-            </a:r>
-            <a:r>
-              <a:rPr lang="en-US" sz="3200" dirty="0" smtClean="0"/>
-              <a:t>)</a:t>
-            </a:r>
-            <a:r>
-              <a:rPr lang="en-US" sz="3200" dirty="0" smtClean="0"/>
-              <a:t> </a:t>
+              <a:t>(N) </a:t>
             </a:r>
             <a:endParaRPr kumimoji="0" lang="en-US" sz="3200" b="0" i="0" u="none" strike="noStrike" kern="1200" cap="none" spc="0" normalizeH="0" noProof="0" dirty="0" smtClean="0">
               <a:ln>
@@ -3693,11 +3688,7 @@
             </a:pPr>
             <a:r>
               <a:rPr lang="en-US" sz="3200" dirty="0" smtClean="0"/>
-              <a:t>	</a:t>
-            </a:r>
-            <a:r>
-              <a:rPr lang="en-US" sz="3200" dirty="0" smtClean="0"/>
-              <a:t>	Entropy = 2.58</a:t>
+              <a:t>		Entropy = 2.58</a:t>
             </a:r>
           </a:p>
           <a:p>
@@ -3718,11 +3709,7 @@
             </a:r>
             <a:r>
               <a:rPr lang="en-US" sz="3200" dirty="0" smtClean="0"/>
-              <a:t>)= 0.1 </a:t>
-            </a:r>
-            <a:r>
-              <a:rPr lang="en-US" sz="3200" dirty="0" smtClean="0"/>
-              <a:t>for </a:t>
+              <a:t>)= 0.1 for </a:t>
             </a:r>
             <a:r>
               <a:rPr lang="en-US" sz="3200" dirty="0" err="1" smtClean="0"/>
@@ -3730,11 +3717,7 @@
             </a:r>
             <a:r>
               <a:rPr lang="en-US" sz="3200" dirty="0" smtClean="0"/>
-              <a:t> = 1, 2, … , </a:t>
-            </a:r>
-            <a:r>
-              <a:rPr lang="en-US" sz="3200" dirty="0" smtClean="0"/>
-              <a:t>5 and p(6) = 0.5)</a:t>
+              <a:t> = 1, 2, … , 5 and p(6) = 0.5)</a:t>
             </a:r>
           </a:p>
           <a:p>
@@ -3745,11 +3728,7 @@
             </a:pPr>
             <a:r>
               <a:rPr lang="en-US" sz="3200" dirty="0" smtClean="0"/>
-              <a:t>	</a:t>
-            </a:r>
-            <a:r>
-              <a:rPr lang="en-US" sz="3200" dirty="0" smtClean="0"/>
-              <a:t>	Entropy = 2.16 (High Entropy, Low Bias)</a:t>
+              <a:t>		Entropy = 2.16 (High Entropy, Low Bias)</a:t>
             </a:r>
           </a:p>
           <a:p>
@@ -3762,11 +3741,7 @@
             </a:pPr>
             <a:r>
               <a:rPr lang="en-US" sz="3200" dirty="0" smtClean="0"/>
-              <a:t>For </a:t>
-            </a:r>
-            <a:r>
-              <a:rPr lang="en-US" sz="3200" dirty="0" smtClean="0"/>
-              <a:t>a biased dice (with p(</a:t>
+              <a:t>For a biased dice (with p(</a:t>
             </a:r>
             <a:r>
               <a:rPr lang="en-US" sz="3200" dirty="0" err="1" smtClean="0"/>
@@ -3774,15 +3749,7 @@
             </a:r>
             <a:r>
               <a:rPr lang="en-US" sz="3200" dirty="0" smtClean="0"/>
-              <a:t>)= </a:t>
-            </a:r>
-            <a:r>
-              <a:rPr lang="en-US" sz="3200" dirty="0" smtClean="0"/>
-              <a:t>0.01 </a:t>
-            </a:r>
-            <a:r>
-              <a:rPr lang="en-US" sz="3200" dirty="0" smtClean="0"/>
-              <a:t>for </a:t>
+              <a:t>)= 0.01 for </a:t>
             </a:r>
             <a:r>
               <a:rPr lang="en-US" sz="3200" dirty="0" err="1" smtClean="0"/>
@@ -3790,15 +3757,7 @@
             </a:r>
             <a:r>
               <a:rPr lang="en-US" sz="3200" dirty="0" smtClean="0"/>
-              <a:t> = 1, 2, … , 5 and p(6) = </a:t>
-            </a:r>
-            <a:r>
-              <a:rPr lang="en-US" sz="3200" dirty="0" smtClean="0"/>
-              <a:t>0.95</a:t>
-            </a:r>
-            <a:r>
-              <a:rPr lang="en-US" sz="3200" dirty="0" smtClean="0"/>
-              <a:t>)</a:t>
+              <a:t> = 1, 2, … , 5 and p(6) = 0.95)</a:t>
             </a:r>
           </a:p>
           <a:p>
@@ -3809,13 +3768,8 @@
             </a:pPr>
             <a:r>
               <a:rPr lang="en-US" sz="3200" dirty="0" smtClean="0"/>
-              <a:t>		Entropy = </a:t>
-            </a:r>
-            <a:r>
-              <a:rPr lang="en-US" sz="3200" dirty="0" smtClean="0"/>
-              <a:t>0.4025 (Low Entropy, High Bias)</a:t>
-            </a:r>
-            <a:endParaRPr lang="en-US" sz="3200" dirty="0" smtClean="0"/>
+              <a:t>		Entropy = 0.4025 (Low Entropy, High Bias)</a:t>
+            </a:r>
           </a:p>
         </p:txBody>
       </p:sp>
@@ -4554,10 +4508,314 @@
               <a:rPr lang="en-US" sz="3200" dirty="0" smtClean="0"/>
               <a:t>Information Gain Minimizes the overall entropy of the system by using the attribute with lowest uncertainty (i.e. we have more knowledge about the occurrence of outcome for that particular attribute).</a:t>
             </a:r>
-            <a:endParaRPr lang="en-US" sz="3200" dirty="0" smtClean="0"/>
-          </a:p>
-        </p:txBody>
-      </p:sp>
+          </a:p>
+        </p:txBody>
+      </p:sp>
+    </p:spTree>
+  </p:cSld>
+  <p:clrMapOvr>
+    <a:masterClrMapping/>
+  </p:clrMapOvr>
+</p:sld>
+</file>
+
+<file path=ppt/slides/slide4.xml><?xml version="1.0" encoding="utf-8"?>
+<p:sld xmlns:a="http://schemas.openxmlformats.org/drawingml/2006/main" xmlns:r="http://schemas.openxmlformats.org/officeDocument/2006/relationships" xmlns:p="http://schemas.openxmlformats.org/presentationml/2006/main">
+  <p:cSld>
+    <p:spTree>
+      <p:nvGrpSpPr>
+        <p:cNvPr id="1" name=""/>
+        <p:cNvGrpSpPr/>
+        <p:nvPr/>
+      </p:nvGrpSpPr>
+      <p:grpSpPr>
+        <a:xfrm>
+          <a:off x="0" y="0"/>
+          <a:ext cx="0" cy="0"/>
+          <a:chOff x="0" y="0"/>
+          <a:chExt cx="0" cy="0"/>
+        </a:xfrm>
+      </p:grpSpPr>
+      <p:sp>
+        <p:nvSpPr>
+          <p:cNvPr id="2" name="Title 1"/>
+          <p:cNvSpPr>
+            <a:spLocks noGrp="1"/>
+          </p:cNvSpPr>
+          <p:nvPr>
+            <p:ph type="title"/>
+          </p:nvPr>
+        </p:nvSpPr>
+        <p:spPr/>
+        <p:txBody>
+          <a:bodyPr/>
+          <a:lstStyle/>
+          <a:p>
+            <a:endParaRPr lang="en-US" dirty="0"/>
+          </a:p>
+        </p:txBody>
+      </p:sp>
+      <p:sp>
+        <p:nvSpPr>
+          <p:cNvPr id="3" name="Content Placeholder 2"/>
+          <p:cNvSpPr>
+            <a:spLocks noGrp="1"/>
+          </p:cNvSpPr>
+          <p:nvPr>
+            <p:ph idx="1"/>
+          </p:nvPr>
+        </p:nvSpPr>
+        <p:spPr/>
+        <p:txBody>
+          <a:bodyPr/>
+          <a:lstStyle/>
+          <a:p>
+            <a:r>
+              <a:rPr lang="en-US" dirty="0" smtClean="0"/>
+              <a:t>55 for T1 (Majority Decisions can be made till Level 5)</a:t>
+            </a:r>
+          </a:p>
+          <a:p>
+            <a:endParaRPr lang="en-US" dirty="0"/>
+          </a:p>
+        </p:txBody>
+      </p:sp>
+      <p:pic>
+        <p:nvPicPr>
+          <p:cNvPr id="1027" name="Picture 3"/>
+          <p:cNvPicPr>
+            <a:picLocks noChangeAspect="1" noChangeArrowheads="1"/>
+          </p:cNvPicPr>
+          <p:nvPr/>
+        </p:nvPicPr>
+        <p:blipFill>
+          <a:blip r:embed="rId2" cstate="print"/>
+          <a:srcRect/>
+          <a:stretch>
+            <a:fillRect/>
+          </a:stretch>
+        </p:blipFill>
+        <p:spPr bwMode="auto">
+          <a:xfrm>
+            <a:off x="609600" y="2590800"/>
+            <a:ext cx="7591426" cy="3877379"/>
+          </a:xfrm>
+          <a:prstGeom prst="rect">
+            <a:avLst/>
+          </a:prstGeom>
+          <a:noFill/>
+          <a:ln w="9525">
+            <a:noFill/>
+            <a:miter lim="800000"/>
+            <a:headEnd/>
+            <a:tailEnd/>
+          </a:ln>
+        </p:spPr>
+      </p:pic>
+    </p:spTree>
+  </p:cSld>
+  <p:clrMapOvr>
+    <a:masterClrMapping/>
+  </p:clrMapOvr>
+</p:sld>
+</file>
+
+<file path=ppt/slides/slide5.xml><?xml version="1.0" encoding="utf-8"?>
+<p:sld xmlns:a="http://schemas.openxmlformats.org/drawingml/2006/main" xmlns:r="http://schemas.openxmlformats.org/officeDocument/2006/relationships" xmlns:p="http://schemas.openxmlformats.org/presentationml/2006/main">
+  <p:cSld>
+    <p:spTree>
+      <p:nvGrpSpPr>
+        <p:cNvPr id="1" name=""/>
+        <p:cNvGrpSpPr/>
+        <p:nvPr/>
+      </p:nvGrpSpPr>
+      <p:grpSpPr>
+        <a:xfrm>
+          <a:off x="0" y="0"/>
+          <a:ext cx="0" cy="0"/>
+          <a:chOff x="0" y="0"/>
+          <a:chExt cx="0" cy="0"/>
+        </a:xfrm>
+      </p:grpSpPr>
+      <p:sp>
+        <p:nvSpPr>
+          <p:cNvPr id="2" name="Title 1"/>
+          <p:cNvSpPr>
+            <a:spLocks noGrp="1"/>
+          </p:cNvSpPr>
+          <p:nvPr>
+            <p:ph type="title"/>
+          </p:nvPr>
+        </p:nvSpPr>
+        <p:spPr/>
+        <p:txBody>
+          <a:bodyPr/>
+          <a:lstStyle/>
+          <a:p>
+            <a:endParaRPr lang="en-US" dirty="0"/>
+          </a:p>
+        </p:txBody>
+      </p:sp>
+      <p:sp>
+        <p:nvSpPr>
+          <p:cNvPr id="3" name="Content Placeholder 2"/>
+          <p:cNvSpPr>
+            <a:spLocks noGrp="1"/>
+          </p:cNvSpPr>
+          <p:nvPr>
+            <p:ph idx="1"/>
+          </p:nvPr>
+        </p:nvSpPr>
+        <p:spPr/>
+        <p:txBody>
+          <a:bodyPr/>
+          <a:lstStyle/>
+          <a:p>
+            <a:r>
+              <a:rPr lang="en-US" dirty="0" smtClean="0"/>
+              <a:t>105 for T2 (6 Levels)</a:t>
+            </a:r>
+          </a:p>
+          <a:p>
+            <a:r>
+              <a:rPr lang="en-US" dirty="0" smtClean="0"/>
+              <a:t>(Have to traverse through all levels to reach a final decision)</a:t>
+            </a:r>
+            <a:endParaRPr lang="en-US" dirty="0"/>
+          </a:p>
+        </p:txBody>
+      </p:sp>
+      <p:pic>
+        <p:nvPicPr>
+          <p:cNvPr id="2050" name="Picture 2"/>
+          <p:cNvPicPr>
+            <a:picLocks noChangeAspect="1" noChangeArrowheads="1"/>
+          </p:cNvPicPr>
+          <p:nvPr/>
+        </p:nvPicPr>
+        <p:blipFill>
+          <a:blip r:embed="rId2" cstate="print"/>
+          <a:srcRect/>
+          <a:stretch>
+            <a:fillRect/>
+          </a:stretch>
+        </p:blipFill>
+        <p:spPr bwMode="auto">
+          <a:xfrm>
+            <a:off x="990600" y="3257550"/>
+            <a:ext cx="7113900" cy="3600450"/>
+          </a:xfrm>
+          <a:prstGeom prst="rect">
+            <a:avLst/>
+          </a:prstGeom>
+          <a:noFill/>
+          <a:ln w="9525">
+            <a:noFill/>
+            <a:miter lim="800000"/>
+            <a:headEnd/>
+            <a:tailEnd/>
+          </a:ln>
+        </p:spPr>
+      </p:pic>
+    </p:spTree>
+  </p:cSld>
+  <p:clrMapOvr>
+    <a:masterClrMapping/>
+  </p:clrMapOvr>
+</p:sld>
+</file>
+
+<file path=ppt/slides/slide6.xml><?xml version="1.0" encoding="utf-8"?>
+<p:sld xmlns:a="http://schemas.openxmlformats.org/drawingml/2006/main" xmlns:r="http://schemas.openxmlformats.org/officeDocument/2006/relationships" xmlns:p="http://schemas.openxmlformats.org/presentationml/2006/main">
+  <p:cSld>
+    <p:spTree>
+      <p:nvGrpSpPr>
+        <p:cNvPr id="1" name=""/>
+        <p:cNvGrpSpPr/>
+        <p:nvPr/>
+      </p:nvGrpSpPr>
+      <p:grpSpPr>
+        <a:xfrm>
+          <a:off x="0" y="0"/>
+          <a:ext cx="0" cy="0"/>
+          <a:chOff x="0" y="0"/>
+          <a:chExt cx="0" cy="0"/>
+        </a:xfrm>
+      </p:grpSpPr>
+      <p:sp>
+        <p:nvSpPr>
+          <p:cNvPr id="2" name="Title 1"/>
+          <p:cNvSpPr>
+            <a:spLocks noGrp="1"/>
+          </p:cNvSpPr>
+          <p:nvPr>
+            <p:ph type="title"/>
+          </p:nvPr>
+        </p:nvSpPr>
+        <p:spPr/>
+        <p:txBody>
+          <a:bodyPr/>
+          <a:lstStyle/>
+          <a:p>
+            <a:endParaRPr lang="en-US" dirty="0"/>
+          </a:p>
+        </p:txBody>
+      </p:sp>
+      <p:sp>
+        <p:nvSpPr>
+          <p:cNvPr id="3" name="Content Placeholder 2"/>
+          <p:cNvSpPr>
+            <a:spLocks noGrp="1"/>
+          </p:cNvSpPr>
+          <p:nvPr>
+            <p:ph idx="1"/>
+          </p:nvPr>
+        </p:nvSpPr>
+        <p:spPr/>
+        <p:txBody>
+          <a:bodyPr/>
+          <a:lstStyle/>
+          <a:p>
+            <a:r>
+              <a:rPr lang="en-US" dirty="0" smtClean="0"/>
+              <a:t>30 Leaf Nodes (Simplest of all the trees, Majority of the decisions are made till Level 4)</a:t>
+            </a:r>
+            <a:endParaRPr lang="en-US" dirty="0"/>
+          </a:p>
+        </p:txBody>
+      </p:sp>
+      <p:pic>
+        <p:nvPicPr>
+          <p:cNvPr id="3074" name="Picture 2"/>
+          <p:cNvPicPr>
+            <a:picLocks noChangeAspect="1" noChangeArrowheads="1"/>
+          </p:cNvPicPr>
+          <p:nvPr/>
+        </p:nvPicPr>
+        <p:blipFill>
+          <a:blip r:embed="rId2" cstate="print"/>
+          <a:srcRect/>
+          <a:stretch>
+            <a:fillRect/>
+          </a:stretch>
+        </p:blipFill>
+        <p:spPr bwMode="auto">
+          <a:xfrm>
+            <a:off x="990600" y="2667000"/>
+            <a:ext cx="7410450" cy="3943368"/>
+          </a:xfrm>
+          <a:prstGeom prst="rect">
+            <a:avLst/>
+          </a:prstGeom>
+          <a:noFill/>
+          <a:ln w="9525">
+            <a:noFill/>
+            <a:miter lim="800000"/>
+            <a:headEnd/>
+            <a:tailEnd/>
+          </a:ln>
+        </p:spPr>
+      </p:pic>
     </p:spTree>
   </p:cSld>
   <p:clrMapOvr>

</xml_diff>